<commit_message>
Updates for Phase 3 Action Items
</commit_message>
<xml_diff>
--- a/Documents/Phase 3/Phase 3 Presentation.pptx
+++ b/Documents/Phase 3/Phase 3 Presentation.pptx
@@ -221,7 +221,7 @@
           <a:p>
             <a:fld id="{614165B0-7FBB-481C-B71C-1F871BDC1D5D}" type="datetimeFigureOut">
               <a:rPr lang="en-US" smtClean="0"/>
-              <a:t>12/11/2016</a:t>
+              <a:t>12/13/2016</a:t>
             </a:fld>
             <a:endParaRPr lang="en-US"/>
           </a:p>
@@ -1340,7 +1340,7 @@
           <a:noFill/>
           <a:extLst>
             <a:ext uri="{909E8E84-426E-40dd-AFC4-6F175D3DCCD1}">
-              <a14:hiddenFill xmlns="" xmlns:a14="http://schemas.microsoft.com/office/drawing/2010/main">
+              <a14:hiddenFill xmlns:a14="http://schemas.microsoft.com/office/drawing/2010/main" xmlns="">
                 <a:solidFill>
                   <a:srgbClr val="FFFFFF"/>
                 </a:solidFill>
@@ -1399,7 +1399,7 @@
             </a:ln>
             <a:extLst>
               <a:ext uri="{91240B29-F687-4f45-9708-019B960494DF}">
-                <a14:hiddenLine xmlns="" xmlns:a14="http://schemas.microsoft.com/office/drawing/2010/main" w="9525">
+                <a14:hiddenLine xmlns:a14="http://schemas.microsoft.com/office/drawing/2010/main" xmlns="" w="9525">
                   <a:solidFill>
                     <a:srgbClr val="000000"/>
                   </a:solidFill>
@@ -1489,7 +1489,7 @@
             </a:ln>
             <a:extLst>
               <a:ext uri="{91240B29-F687-4f45-9708-019B960494DF}">
-                <a14:hiddenLine xmlns="" xmlns:a14="http://schemas.microsoft.com/office/drawing/2010/main" w="9525">
+                <a14:hiddenLine xmlns:a14="http://schemas.microsoft.com/office/drawing/2010/main" xmlns="" w="9525">
                   <a:solidFill>
                     <a:srgbClr val="000000"/>
                   </a:solidFill>
@@ -1579,7 +1579,7 @@
             </a:ln>
             <a:extLst>
               <a:ext uri="{91240B29-F687-4f45-9708-019B960494DF}">
-                <a14:hiddenLine xmlns="" xmlns:a14="http://schemas.microsoft.com/office/drawing/2010/main" w="9525">
+                <a14:hiddenLine xmlns:a14="http://schemas.microsoft.com/office/drawing/2010/main" xmlns="" w="9525">
                   <a:solidFill>
                     <a:srgbClr val="000000"/>
                   </a:solidFill>
@@ -1613,7 +1613,7 @@
             </a:ln>
             <a:extLst>
               <a:ext uri="{91240B29-F687-4f45-9708-019B960494DF}">
-                <a14:hiddenLine xmlns="" xmlns:a14="http://schemas.microsoft.com/office/drawing/2010/main" w="9525">
+                <a14:hiddenLine xmlns:a14="http://schemas.microsoft.com/office/drawing/2010/main" xmlns="" w="9525">
                   <a:solidFill>
                     <a:srgbClr val="000000"/>
                   </a:solidFill>
@@ -1703,7 +1703,7 @@
             </a:ln>
             <a:extLst>
               <a:ext uri="{91240B29-F687-4f45-9708-019B960494DF}">
-                <a14:hiddenLine xmlns="" xmlns:a14="http://schemas.microsoft.com/office/drawing/2010/main" w="9525">
+                <a14:hiddenLine xmlns:a14="http://schemas.microsoft.com/office/drawing/2010/main" xmlns="" w="9525">
                   <a:solidFill>
                     <a:srgbClr val="000000"/>
                   </a:solidFill>
@@ -1765,7 +1765,7 @@
             </a:ln>
             <a:extLst>
               <a:ext uri="{91240B29-F687-4f45-9708-019B960494DF}">
-                <a14:hiddenLine xmlns="" xmlns:a14="http://schemas.microsoft.com/office/drawing/2010/main" w="9525">
+                <a14:hiddenLine xmlns:a14="http://schemas.microsoft.com/office/drawing/2010/main" xmlns="" w="9525">
                   <a:solidFill>
                     <a:srgbClr val="000000"/>
                   </a:solidFill>
@@ -1827,7 +1827,7 @@
             </a:ln>
             <a:extLst>
               <a:ext uri="{91240B29-F687-4f45-9708-019B960494DF}">
-                <a14:hiddenLine xmlns="" xmlns:a14="http://schemas.microsoft.com/office/drawing/2010/main" w="9525">
+                <a14:hiddenLine xmlns:a14="http://schemas.microsoft.com/office/drawing/2010/main" xmlns="" w="9525">
                   <a:solidFill>
                     <a:srgbClr val="000000"/>
                   </a:solidFill>
@@ -1917,7 +1917,7 @@
             </a:ln>
             <a:extLst>
               <a:ext uri="{91240B29-F687-4f45-9708-019B960494DF}">
-                <a14:hiddenLine xmlns="" xmlns:a14="http://schemas.microsoft.com/office/drawing/2010/main" w="9525">
+                <a14:hiddenLine xmlns:a14="http://schemas.microsoft.com/office/drawing/2010/main" xmlns="" w="9525">
                   <a:solidFill>
                     <a:srgbClr val="000000"/>
                   </a:solidFill>
@@ -1979,7 +1979,7 @@
             </a:ln>
             <a:extLst>
               <a:ext uri="{91240B29-F687-4f45-9708-019B960494DF}">
-                <a14:hiddenLine xmlns="" xmlns:a14="http://schemas.microsoft.com/office/drawing/2010/main" w="9525">
+                <a14:hiddenLine xmlns:a14="http://schemas.microsoft.com/office/drawing/2010/main" xmlns="" w="9525">
                   <a:solidFill>
                     <a:srgbClr val="000000"/>
                   </a:solidFill>
@@ -2041,7 +2041,7 @@
             </a:ln>
             <a:extLst>
               <a:ext uri="{91240B29-F687-4f45-9708-019B960494DF}">
-                <a14:hiddenLine xmlns="" xmlns:a14="http://schemas.microsoft.com/office/drawing/2010/main" w="9525">
+                <a14:hiddenLine xmlns:a14="http://schemas.microsoft.com/office/drawing/2010/main" xmlns="" w="9525">
                   <a:solidFill>
                     <a:srgbClr val="000000"/>
                   </a:solidFill>
@@ -2131,7 +2131,7 @@
             </a:ln>
             <a:extLst>
               <a:ext uri="{91240B29-F687-4f45-9708-019B960494DF}">
-                <a14:hiddenLine xmlns="" xmlns:a14="http://schemas.microsoft.com/office/drawing/2010/main" w="9525">
+                <a14:hiddenLine xmlns:a14="http://schemas.microsoft.com/office/drawing/2010/main" xmlns="" w="9525">
                   <a:solidFill>
                     <a:srgbClr val="000000"/>
                   </a:solidFill>
@@ -2221,7 +2221,7 @@
             </a:ln>
             <a:extLst>
               <a:ext uri="{91240B29-F687-4f45-9708-019B960494DF}">
-                <a14:hiddenLine xmlns="" xmlns:a14="http://schemas.microsoft.com/office/drawing/2010/main" w="9525">
+                <a14:hiddenLine xmlns:a14="http://schemas.microsoft.com/office/drawing/2010/main" xmlns="" w="9525">
                   <a:solidFill>
                     <a:srgbClr val="000000"/>
                   </a:solidFill>
@@ -2283,7 +2283,7 @@
             </a:ln>
             <a:extLst>
               <a:ext uri="{91240B29-F687-4f45-9708-019B960494DF}">
-                <a14:hiddenLine xmlns="" xmlns:a14="http://schemas.microsoft.com/office/drawing/2010/main" w="9525">
+                <a14:hiddenLine xmlns:a14="http://schemas.microsoft.com/office/drawing/2010/main" xmlns="" w="9525">
                   <a:solidFill>
                     <a:srgbClr val="000000"/>
                   </a:solidFill>
@@ -2393,7 +2393,7 @@
             </a:ln>
             <a:extLst>
               <a:ext uri="{91240B29-F687-4f45-9708-019B960494DF}">
-                <a14:hiddenLine xmlns="" xmlns:a14="http://schemas.microsoft.com/office/drawing/2010/main" w="9525">
+                <a14:hiddenLine xmlns:a14="http://schemas.microsoft.com/office/drawing/2010/main" xmlns="" w="9525">
                   <a:solidFill>
                     <a:srgbClr val="000000"/>
                   </a:solidFill>
@@ -2455,7 +2455,7 @@
             </a:ln>
             <a:extLst>
               <a:ext uri="{91240B29-F687-4f45-9708-019B960494DF}">
-                <a14:hiddenLine xmlns="" xmlns:a14="http://schemas.microsoft.com/office/drawing/2010/main" w="9525">
+                <a14:hiddenLine xmlns:a14="http://schemas.microsoft.com/office/drawing/2010/main" xmlns="" w="9525">
                   <a:solidFill>
                     <a:srgbClr val="000000"/>
                   </a:solidFill>
@@ -2545,7 +2545,7 @@
             </a:ln>
             <a:extLst>
               <a:ext uri="{91240B29-F687-4f45-9708-019B960494DF}">
-                <a14:hiddenLine xmlns="" xmlns:a14="http://schemas.microsoft.com/office/drawing/2010/main" w="9525">
+                <a14:hiddenLine xmlns:a14="http://schemas.microsoft.com/office/drawing/2010/main" xmlns="" w="9525">
                   <a:solidFill>
                     <a:srgbClr val="000000"/>
                   </a:solidFill>
@@ -2635,7 +2635,7 @@
             </a:ln>
             <a:extLst>
               <a:ext uri="{91240B29-F687-4f45-9708-019B960494DF}">
-                <a14:hiddenLine xmlns="" xmlns:a14="http://schemas.microsoft.com/office/drawing/2010/main" w="9525">
+                <a14:hiddenLine xmlns:a14="http://schemas.microsoft.com/office/drawing/2010/main" xmlns="" w="9525">
                   <a:solidFill>
                     <a:srgbClr val="000000"/>
                   </a:solidFill>
@@ -2697,7 +2697,7 @@
             </a:ln>
             <a:extLst>
               <a:ext uri="{91240B29-F687-4f45-9708-019B960494DF}">
-                <a14:hiddenLine xmlns="" xmlns:a14="http://schemas.microsoft.com/office/drawing/2010/main" w="9525">
+                <a14:hiddenLine xmlns:a14="http://schemas.microsoft.com/office/drawing/2010/main" xmlns="" w="9525">
                   <a:solidFill>
                     <a:srgbClr val="000000"/>
                   </a:solidFill>
@@ -2787,7 +2787,7 @@
             </a:ln>
             <a:extLst>
               <a:ext uri="{91240B29-F687-4f45-9708-019B960494DF}">
-                <a14:hiddenLine xmlns="" xmlns:a14="http://schemas.microsoft.com/office/drawing/2010/main" w="9525">
+                <a14:hiddenLine xmlns:a14="http://schemas.microsoft.com/office/drawing/2010/main" xmlns="" w="9525">
                   <a:solidFill>
                     <a:srgbClr val="000000"/>
                   </a:solidFill>
@@ -2877,7 +2877,7 @@
             </a:ln>
             <a:extLst>
               <a:ext uri="{91240B29-F687-4f45-9708-019B960494DF}">
-                <a14:hiddenLine xmlns="" xmlns:a14="http://schemas.microsoft.com/office/drawing/2010/main" w="9525">
+                <a14:hiddenLine xmlns:a14="http://schemas.microsoft.com/office/drawing/2010/main" xmlns="" w="9525">
                   <a:solidFill>
                     <a:srgbClr val="000000"/>
                   </a:solidFill>
@@ -2933,7 +2933,7 @@
             </a:ln>
             <a:extLst>
               <a:ext uri="{91240B29-F687-4f45-9708-019B960494DF}">
-                <a14:hiddenLine xmlns="" xmlns:a14="http://schemas.microsoft.com/office/drawing/2010/main" w="9525">
+                <a14:hiddenLine xmlns:a14="http://schemas.microsoft.com/office/drawing/2010/main" xmlns="" w="9525">
                   <a:solidFill>
                     <a:srgbClr val="000000"/>
                   </a:solidFill>
@@ -3023,7 +3023,7 @@
             </a:ln>
             <a:extLst>
               <a:ext uri="{91240B29-F687-4f45-9708-019B960494DF}">
-                <a14:hiddenLine xmlns="" xmlns:a14="http://schemas.microsoft.com/office/drawing/2010/main" w="9525">
+                <a14:hiddenLine xmlns:a14="http://schemas.microsoft.com/office/drawing/2010/main" xmlns="" w="9525">
                   <a:solidFill>
                     <a:srgbClr val="000000"/>
                   </a:solidFill>
@@ -3079,7 +3079,7 @@
             </a:ln>
             <a:extLst>
               <a:ext uri="{91240B29-F687-4f45-9708-019B960494DF}">
-                <a14:hiddenLine xmlns="" xmlns:a14="http://schemas.microsoft.com/office/drawing/2010/main" w="9525">
+                <a14:hiddenLine xmlns:a14="http://schemas.microsoft.com/office/drawing/2010/main" xmlns="" w="9525">
                   <a:solidFill>
                     <a:srgbClr val="000000"/>
                   </a:solidFill>
@@ -3169,7 +3169,7 @@
             </a:ln>
             <a:extLst>
               <a:ext uri="{91240B29-F687-4f45-9708-019B960494DF}">
-                <a14:hiddenLine xmlns="" xmlns:a14="http://schemas.microsoft.com/office/drawing/2010/main" w="9525">
+                <a14:hiddenLine xmlns:a14="http://schemas.microsoft.com/office/drawing/2010/main" xmlns="" w="9525">
                   <a:solidFill>
                     <a:srgbClr val="000000"/>
                   </a:solidFill>
@@ -3237,7 +3237,7 @@
             </a:ln>
             <a:extLst>
               <a:ext uri="{91240B29-F687-4f45-9708-019B960494DF}">
-                <a14:hiddenLine xmlns="" xmlns:a14="http://schemas.microsoft.com/office/drawing/2010/main" w="9525">
+                <a14:hiddenLine xmlns:a14="http://schemas.microsoft.com/office/drawing/2010/main" xmlns="" w="9525">
                   <a:solidFill>
                     <a:srgbClr val="000000"/>
                   </a:solidFill>
@@ -3327,7 +3327,7 @@
             </a:ln>
             <a:extLst>
               <a:ext uri="{91240B29-F687-4f45-9708-019B960494DF}">
-                <a14:hiddenLine xmlns="" xmlns:a14="http://schemas.microsoft.com/office/drawing/2010/main" w="9525">
+                <a14:hiddenLine xmlns:a14="http://schemas.microsoft.com/office/drawing/2010/main" xmlns="" w="9525">
                   <a:solidFill>
                     <a:srgbClr val="000000"/>
                   </a:solidFill>
@@ -3395,7 +3395,7 @@
             </a:ln>
             <a:extLst>
               <a:ext uri="{91240B29-F687-4f45-9708-019B960494DF}">
-                <a14:hiddenLine xmlns="" xmlns:a14="http://schemas.microsoft.com/office/drawing/2010/main" w="9525">
+                <a14:hiddenLine xmlns:a14="http://schemas.microsoft.com/office/drawing/2010/main" xmlns="" w="9525">
                   <a:solidFill>
                     <a:srgbClr val="000000"/>
                   </a:solidFill>
@@ -3485,7 +3485,7 @@
             </a:ln>
             <a:extLst>
               <a:ext uri="{91240B29-F687-4f45-9708-019B960494DF}">
-                <a14:hiddenLine xmlns="" xmlns:a14="http://schemas.microsoft.com/office/drawing/2010/main" w="9525">
+                <a14:hiddenLine xmlns:a14="http://schemas.microsoft.com/office/drawing/2010/main" xmlns="" w="9525">
                   <a:solidFill>
                     <a:srgbClr val="000000"/>
                   </a:solidFill>
@@ -3519,7 +3519,7 @@
             </a:ln>
             <a:extLst>
               <a:ext uri="{91240B29-F687-4f45-9708-019B960494DF}">
-                <a14:hiddenLine xmlns="" xmlns:a14="http://schemas.microsoft.com/office/drawing/2010/main" w="9525">
+                <a14:hiddenLine xmlns:a14="http://schemas.microsoft.com/office/drawing/2010/main" xmlns="" w="9525">
                   <a:solidFill>
                     <a:srgbClr val="000000"/>
                   </a:solidFill>
@@ -3609,7 +3609,7 @@
             </a:ln>
             <a:extLst>
               <a:ext uri="{91240B29-F687-4f45-9708-019B960494DF}">
-                <a14:hiddenLine xmlns="" xmlns:a14="http://schemas.microsoft.com/office/drawing/2010/main" w="9525">
+                <a14:hiddenLine xmlns:a14="http://schemas.microsoft.com/office/drawing/2010/main" xmlns="" w="9525">
                   <a:solidFill>
                     <a:srgbClr val="000000"/>
                   </a:solidFill>
@@ -3671,7 +3671,7 @@
             </a:ln>
             <a:extLst>
               <a:ext uri="{91240B29-F687-4f45-9708-019B960494DF}">
-                <a14:hiddenLine xmlns="" xmlns:a14="http://schemas.microsoft.com/office/drawing/2010/main" w="9525">
+                <a14:hiddenLine xmlns:a14="http://schemas.microsoft.com/office/drawing/2010/main" xmlns="" w="9525">
                   <a:solidFill>
                     <a:srgbClr val="000000"/>
                   </a:solidFill>
@@ -3733,7 +3733,7 @@
             </a:ln>
             <a:extLst>
               <a:ext uri="{91240B29-F687-4f45-9708-019B960494DF}">
-                <a14:hiddenLine xmlns="" xmlns:a14="http://schemas.microsoft.com/office/drawing/2010/main" w="9525">
+                <a14:hiddenLine xmlns:a14="http://schemas.microsoft.com/office/drawing/2010/main" xmlns="" w="9525">
                   <a:solidFill>
                     <a:srgbClr val="000000"/>
                   </a:solidFill>
@@ -3823,7 +3823,7 @@
             </a:ln>
             <a:extLst>
               <a:ext uri="{91240B29-F687-4f45-9708-019B960494DF}">
-                <a14:hiddenLine xmlns="" xmlns:a14="http://schemas.microsoft.com/office/drawing/2010/main" w="9525">
+                <a14:hiddenLine xmlns:a14="http://schemas.microsoft.com/office/drawing/2010/main" xmlns="" w="9525">
                   <a:solidFill>
                     <a:srgbClr val="000000"/>
                   </a:solidFill>
@@ -3891,7 +3891,7 @@
             </a:ln>
             <a:extLst>
               <a:ext uri="{91240B29-F687-4f45-9708-019B960494DF}">
-                <a14:hiddenLine xmlns="" xmlns:a14="http://schemas.microsoft.com/office/drawing/2010/main" w="9525">
+                <a14:hiddenLine xmlns:a14="http://schemas.microsoft.com/office/drawing/2010/main" xmlns="" w="9525">
                   <a:solidFill>
                     <a:srgbClr val="000000"/>
                   </a:solidFill>
@@ -3953,7 +3953,7 @@
             </a:ln>
             <a:extLst>
               <a:ext uri="{91240B29-F687-4f45-9708-019B960494DF}">
-                <a14:hiddenLine xmlns="" xmlns:a14="http://schemas.microsoft.com/office/drawing/2010/main" w="9525">
+                <a14:hiddenLine xmlns:a14="http://schemas.microsoft.com/office/drawing/2010/main" xmlns="" w="9525">
                   <a:solidFill>
                     <a:srgbClr val="000000"/>
                   </a:solidFill>
@@ -4043,7 +4043,7 @@
             </a:ln>
             <a:extLst>
               <a:ext uri="{91240B29-F687-4f45-9708-019B960494DF}">
-                <a14:hiddenLine xmlns="" xmlns:a14="http://schemas.microsoft.com/office/drawing/2010/main" w="9525">
+                <a14:hiddenLine xmlns:a14="http://schemas.microsoft.com/office/drawing/2010/main" xmlns="" w="9525">
                   <a:solidFill>
                     <a:srgbClr val="000000"/>
                   </a:solidFill>
@@ -4105,7 +4105,7 @@
             </a:ln>
             <a:extLst>
               <a:ext uri="{91240B29-F687-4f45-9708-019B960494DF}">
-                <a14:hiddenLine xmlns="" xmlns:a14="http://schemas.microsoft.com/office/drawing/2010/main" w="9525">
+                <a14:hiddenLine xmlns:a14="http://schemas.microsoft.com/office/drawing/2010/main" xmlns="" w="9525">
                   <a:solidFill>
                     <a:srgbClr val="000000"/>
                   </a:solidFill>
@@ -4195,7 +4195,7 @@
             </a:ln>
             <a:extLst>
               <a:ext uri="{91240B29-F687-4f45-9708-019B960494DF}">
-                <a14:hiddenLine xmlns="" xmlns:a14="http://schemas.microsoft.com/office/drawing/2010/main" w="9525">
+                <a14:hiddenLine xmlns:a14="http://schemas.microsoft.com/office/drawing/2010/main" xmlns="" w="9525">
                   <a:solidFill>
                     <a:srgbClr val="000000"/>
                   </a:solidFill>
@@ -4257,7 +4257,7 @@
             </a:ln>
             <a:extLst>
               <a:ext uri="{91240B29-F687-4f45-9708-019B960494DF}">
-                <a14:hiddenLine xmlns="" xmlns:a14="http://schemas.microsoft.com/office/drawing/2010/main" w="9525">
+                <a14:hiddenLine xmlns:a14="http://schemas.microsoft.com/office/drawing/2010/main" xmlns="" w="9525">
                   <a:solidFill>
                     <a:srgbClr val="000000"/>
                   </a:solidFill>
@@ -4347,7 +4347,7 @@
             </a:ln>
             <a:extLst>
               <a:ext uri="{91240B29-F687-4f45-9708-019B960494DF}">
-                <a14:hiddenLine xmlns="" xmlns:a14="http://schemas.microsoft.com/office/drawing/2010/main" w="9525">
+                <a14:hiddenLine xmlns:a14="http://schemas.microsoft.com/office/drawing/2010/main" xmlns="" w="9525">
                   <a:solidFill>
                     <a:srgbClr val="000000"/>
                   </a:solidFill>
@@ -4381,7 +4381,7 @@
             </a:ln>
             <a:extLst>
               <a:ext uri="{91240B29-F687-4f45-9708-019B960494DF}">
-                <a14:hiddenLine xmlns="" xmlns:a14="http://schemas.microsoft.com/office/drawing/2010/main" w="9525">
+                <a14:hiddenLine xmlns:a14="http://schemas.microsoft.com/office/drawing/2010/main" xmlns="" w="9525">
                   <a:solidFill>
                     <a:srgbClr val="000000"/>
                   </a:solidFill>
@@ -4446,7 +4446,7 @@
             </a:ln>
             <a:extLst>
               <a:ext uri="{91240B29-F687-4f45-9708-019B960494DF}">
-                <a14:hiddenLine xmlns="" xmlns:a14="http://schemas.microsoft.com/office/drawing/2010/main" w="9525">
+                <a14:hiddenLine xmlns:a14="http://schemas.microsoft.com/office/drawing/2010/main" xmlns="" w="9525">
                   <a:solidFill>
                     <a:srgbClr val="000000"/>
                   </a:solidFill>
@@ -4536,7 +4536,7 @@
             </a:ln>
             <a:extLst>
               <a:ext uri="{91240B29-F687-4f45-9708-019B960494DF}">
-                <a14:hiddenLine xmlns="" xmlns:a14="http://schemas.microsoft.com/office/drawing/2010/main" w="9525">
+                <a14:hiddenLine xmlns:a14="http://schemas.microsoft.com/office/drawing/2010/main" xmlns="" w="9525">
                   <a:solidFill>
                     <a:srgbClr val="000000"/>
                   </a:solidFill>
@@ -4598,7 +4598,7 @@
             </a:ln>
             <a:extLst>
               <a:ext uri="{91240B29-F687-4f45-9708-019B960494DF}">
-                <a14:hiddenLine xmlns="" xmlns:a14="http://schemas.microsoft.com/office/drawing/2010/main" w="9525">
+                <a14:hiddenLine xmlns:a14="http://schemas.microsoft.com/office/drawing/2010/main" xmlns="" w="9525">
                   <a:solidFill>
                     <a:srgbClr val="000000"/>
                   </a:solidFill>
@@ -4688,7 +4688,7 @@
             </a:ln>
             <a:extLst>
               <a:ext uri="{91240B29-F687-4f45-9708-019B960494DF}">
-                <a14:hiddenLine xmlns="" xmlns:a14="http://schemas.microsoft.com/office/drawing/2010/main" w="9525">
+                <a14:hiddenLine xmlns:a14="http://schemas.microsoft.com/office/drawing/2010/main" xmlns="" w="9525">
                   <a:solidFill>
                     <a:srgbClr val="000000"/>
                   </a:solidFill>
@@ -4778,7 +4778,7 @@
             </a:ln>
             <a:extLst>
               <a:ext uri="{91240B29-F687-4f45-9708-019B960494DF}">
-                <a14:hiddenLine xmlns="" xmlns:a14="http://schemas.microsoft.com/office/drawing/2010/main" w="9525">
+                <a14:hiddenLine xmlns:a14="http://schemas.microsoft.com/office/drawing/2010/main" xmlns="" w="9525">
                   <a:solidFill>
                     <a:srgbClr val="000000"/>
                   </a:solidFill>
@@ -4843,7 +4843,7 @@
             </a:ln>
             <a:extLst>
               <a:ext uri="{91240B29-F687-4f45-9708-019B960494DF}">
-                <a14:hiddenLine xmlns="" xmlns:a14="http://schemas.microsoft.com/office/drawing/2010/main" w="9525">
+                <a14:hiddenLine xmlns:a14="http://schemas.microsoft.com/office/drawing/2010/main" xmlns="" w="9525">
                   <a:solidFill>
                     <a:srgbClr val="000000"/>
                   </a:solidFill>
@@ -4905,7 +4905,7 @@
             </a:ln>
             <a:extLst>
               <a:ext uri="{91240B29-F687-4f45-9708-019B960494DF}">
-                <a14:hiddenLine xmlns="" xmlns:a14="http://schemas.microsoft.com/office/drawing/2010/main" w="9525">
+                <a14:hiddenLine xmlns:a14="http://schemas.microsoft.com/office/drawing/2010/main" xmlns="" w="9525">
                   <a:solidFill>
                     <a:srgbClr val="000000"/>
                   </a:solidFill>
@@ -4995,7 +4995,7 @@
             </a:ln>
             <a:extLst>
               <a:ext uri="{91240B29-F687-4f45-9708-019B960494DF}">
-                <a14:hiddenLine xmlns="" xmlns:a14="http://schemas.microsoft.com/office/drawing/2010/main" w="9525">
+                <a14:hiddenLine xmlns:a14="http://schemas.microsoft.com/office/drawing/2010/main" xmlns="" w="9525">
                   <a:solidFill>
                     <a:srgbClr val="000000"/>
                   </a:solidFill>
@@ -5085,7 +5085,7 @@
             </a:ln>
             <a:extLst>
               <a:ext uri="{91240B29-F687-4f45-9708-019B960494DF}">
-                <a14:hiddenLine xmlns="" xmlns:a14="http://schemas.microsoft.com/office/drawing/2010/main" w="9525">
+                <a14:hiddenLine xmlns:a14="http://schemas.microsoft.com/office/drawing/2010/main" xmlns="" w="9525">
                   <a:solidFill>
                     <a:srgbClr val="000000"/>
                   </a:solidFill>
@@ -5147,7 +5147,7 @@
             </a:ln>
             <a:extLst>
               <a:ext uri="{91240B29-F687-4f45-9708-019B960494DF}">
-                <a14:hiddenLine xmlns="" xmlns:a14="http://schemas.microsoft.com/office/drawing/2010/main" w="9525">
+                <a14:hiddenLine xmlns:a14="http://schemas.microsoft.com/office/drawing/2010/main" xmlns="" w="9525">
                   <a:solidFill>
                     <a:srgbClr val="000000"/>
                   </a:solidFill>
@@ -5267,7 +5267,7 @@
             </a:ln>
             <a:extLst>
               <a:ext uri="{91240B29-F687-4f45-9708-019B960494DF}">
-                <a14:hiddenLine xmlns="" xmlns:a14="http://schemas.microsoft.com/office/drawing/2010/main" w="9525">
+                <a14:hiddenLine xmlns:a14="http://schemas.microsoft.com/office/drawing/2010/main" xmlns="" w="9525">
                   <a:solidFill>
                     <a:srgbClr val="000000"/>
                   </a:solidFill>
@@ -5335,7 +5335,7 @@
             </a:ln>
             <a:extLst>
               <a:ext uri="{91240B29-F687-4f45-9708-019B960494DF}">
-                <a14:hiddenLine xmlns="" xmlns:a14="http://schemas.microsoft.com/office/drawing/2010/main" w="9525">
+                <a14:hiddenLine xmlns:a14="http://schemas.microsoft.com/office/drawing/2010/main" xmlns="" w="9525">
                   <a:solidFill>
                     <a:srgbClr val="000000"/>
                   </a:solidFill>
@@ -5425,7 +5425,7 @@
             </a:ln>
             <a:extLst>
               <a:ext uri="{91240B29-F687-4f45-9708-019B960494DF}">
-                <a14:hiddenLine xmlns="" xmlns:a14="http://schemas.microsoft.com/office/drawing/2010/main" w="9525">
+                <a14:hiddenLine xmlns:a14="http://schemas.microsoft.com/office/drawing/2010/main" xmlns="" w="9525">
                   <a:solidFill>
                     <a:srgbClr val="000000"/>
                   </a:solidFill>
@@ -5565,7 +5565,7 @@
           <a:p>
             <a:fld id="{071F4C33-94A3-4D29-AE8D-33950698FF4C}" type="datetimeFigureOut">
               <a:rPr lang="en-US" smtClean="0"/>
-              <a:t>12/11/2016</a:t>
+              <a:t>12/13/2016</a:t>
             </a:fld>
             <a:endParaRPr lang="en-US"/>
           </a:p>
@@ -5832,7 +5832,7 @@
           <a:p>
             <a:fld id="{071F4C33-94A3-4D29-AE8D-33950698FF4C}" type="datetimeFigureOut">
               <a:rPr lang="en-US" smtClean="0"/>
-              <a:t>12/11/2016</a:t>
+              <a:t>12/13/2016</a:t>
             </a:fld>
             <a:endParaRPr lang="en-US"/>
           </a:p>
@@ -6028,7 +6028,7 @@
           <a:p>
             <a:fld id="{071F4C33-94A3-4D29-AE8D-33950698FF4C}" type="datetimeFigureOut">
               <a:rPr lang="en-US" smtClean="0"/>
-              <a:t>12/11/2016</a:t>
+              <a:t>12/13/2016</a:t>
             </a:fld>
             <a:endParaRPr lang="en-US"/>
           </a:p>
@@ -6291,7 +6291,7 @@
           <a:p>
             <a:fld id="{071F4C33-94A3-4D29-AE8D-33950698FF4C}" type="datetimeFigureOut">
               <a:rPr lang="en-US" smtClean="0"/>
-              <a:t>12/11/2016</a:t>
+              <a:t>12/13/2016</a:t>
             </a:fld>
             <a:endParaRPr lang="en-US"/>
           </a:p>
@@ -6725,7 +6725,7 @@
           <a:p>
             <a:fld id="{071F4C33-94A3-4D29-AE8D-33950698FF4C}" type="datetimeFigureOut">
               <a:rPr lang="en-US" smtClean="0"/>
-              <a:t>12/11/2016</a:t>
+              <a:t>12/13/2016</a:t>
             </a:fld>
             <a:endParaRPr lang="en-US"/>
           </a:p>
@@ -7271,7 +7271,7 @@
           <a:p>
             <a:fld id="{071F4C33-94A3-4D29-AE8D-33950698FF4C}" type="datetimeFigureOut">
               <a:rPr lang="en-US" smtClean="0"/>
-              <a:t>12/11/2016</a:t>
+              <a:t>12/13/2016</a:t>
             </a:fld>
             <a:endParaRPr lang="en-US"/>
           </a:p>
@@ -7991,7 +7991,7 @@
           <a:p>
             <a:fld id="{071F4C33-94A3-4D29-AE8D-33950698FF4C}" type="datetimeFigureOut">
               <a:rPr lang="en-US" smtClean="0"/>
-              <a:t>12/11/2016</a:t>
+              <a:t>12/13/2016</a:t>
             </a:fld>
             <a:endParaRPr lang="en-US"/>
           </a:p>
@@ -8161,7 +8161,7 @@
           <a:p>
             <a:fld id="{071F4C33-94A3-4D29-AE8D-33950698FF4C}" type="datetimeFigureOut">
               <a:rPr lang="en-US" smtClean="0"/>
-              <a:t>12/11/2016</a:t>
+              <a:t>12/13/2016</a:t>
             </a:fld>
             <a:endParaRPr lang="en-US"/>
           </a:p>
@@ -8341,7 +8341,7 @@
           <a:p>
             <a:fld id="{071F4C33-94A3-4D29-AE8D-33950698FF4C}" type="datetimeFigureOut">
               <a:rPr lang="en-US" smtClean="0"/>
-              <a:t>12/11/2016</a:t>
+              <a:t>12/13/2016</a:t>
             </a:fld>
             <a:endParaRPr lang="en-US"/>
           </a:p>
@@ -8511,7 +8511,7 @@
           <a:p>
             <a:fld id="{071F4C33-94A3-4D29-AE8D-33950698FF4C}" type="datetimeFigureOut">
               <a:rPr lang="en-US" smtClean="0"/>
-              <a:t>12/11/2016</a:t>
+              <a:t>12/13/2016</a:t>
             </a:fld>
             <a:endParaRPr lang="en-US"/>
           </a:p>
@@ -8761,7 +8761,7 @@
           <a:p>
             <a:fld id="{071F4C33-94A3-4D29-AE8D-33950698FF4C}" type="datetimeFigureOut">
               <a:rPr lang="en-US" smtClean="0"/>
-              <a:t>12/11/2016</a:t>
+              <a:t>12/13/2016</a:t>
             </a:fld>
             <a:endParaRPr lang="en-US"/>
           </a:p>
@@ -8993,7 +8993,7 @@
           <a:p>
             <a:fld id="{071F4C33-94A3-4D29-AE8D-33950698FF4C}" type="datetimeFigureOut">
               <a:rPr lang="en-US" smtClean="0"/>
-              <a:t>12/11/2016</a:t>
+              <a:t>12/13/2016</a:t>
             </a:fld>
             <a:endParaRPr lang="en-US"/>
           </a:p>
@@ -9374,7 +9374,7 @@
           <a:p>
             <a:fld id="{071F4C33-94A3-4D29-AE8D-33950698FF4C}" type="datetimeFigureOut">
               <a:rPr lang="en-US" smtClean="0"/>
-              <a:t>12/11/2016</a:t>
+              <a:t>12/13/2016</a:t>
             </a:fld>
             <a:endParaRPr lang="en-US"/>
           </a:p>
@@ -9492,7 +9492,7 @@
           <a:p>
             <a:fld id="{071F4C33-94A3-4D29-AE8D-33950698FF4C}" type="datetimeFigureOut">
               <a:rPr lang="en-US" smtClean="0"/>
-              <a:t>12/11/2016</a:t>
+              <a:t>12/13/2016</a:t>
             </a:fld>
             <a:endParaRPr lang="en-US"/>
           </a:p>
@@ -9587,7 +9587,7 @@
           <a:p>
             <a:fld id="{071F4C33-94A3-4D29-AE8D-33950698FF4C}" type="datetimeFigureOut">
               <a:rPr lang="en-US" smtClean="0"/>
-              <a:t>12/11/2016</a:t>
+              <a:t>12/13/2016</a:t>
             </a:fld>
             <a:endParaRPr lang="en-US"/>
           </a:p>
@@ -9836,7 +9836,7 @@
           <a:p>
             <a:fld id="{071F4C33-94A3-4D29-AE8D-33950698FF4C}" type="datetimeFigureOut">
               <a:rPr lang="en-US" smtClean="0"/>
-              <a:t>12/11/2016</a:t>
+              <a:t>12/13/2016</a:t>
             </a:fld>
             <a:endParaRPr lang="en-US"/>
           </a:p>
@@ -10116,7 +10116,7 @@
           <a:p>
             <a:fld id="{071F4C33-94A3-4D29-AE8D-33950698FF4C}" type="datetimeFigureOut">
               <a:rPr lang="en-US" smtClean="0"/>
-              <a:t>12/11/2016</a:t>
+              <a:t>12/13/2016</a:t>
             </a:fld>
             <a:endParaRPr lang="en-US"/>
           </a:p>
@@ -10239,7 +10239,7 @@
           <a:noFill/>
           <a:extLst>
             <a:ext uri="{909E8E84-426E-40dd-AFC4-6F175D3DCCD1}">
-              <a14:hiddenFill xmlns="" xmlns:a14="http://schemas.microsoft.com/office/drawing/2010/main">
+              <a14:hiddenFill xmlns:a14="http://schemas.microsoft.com/office/drawing/2010/main" xmlns="">
                 <a:solidFill>
                   <a:srgbClr val="FFFFFF"/>
                 </a:solidFill>
@@ -10313,7 +10313,7 @@
               </a:ln>
               <a:extLst>
                 <a:ext uri="{91240B29-F687-4f45-9708-019B960494DF}">
-                  <a14:hiddenLine xmlns="" xmlns:a14="http://schemas.microsoft.com/office/drawing/2010/main" w="9525">
+                  <a14:hiddenLine xmlns:a14="http://schemas.microsoft.com/office/drawing/2010/main" xmlns="" w="9525">
                     <a:solidFill>
                       <a:srgbClr val="000000"/>
                     </a:solidFill>
@@ -10403,7 +10403,7 @@
               </a:ln>
               <a:extLst>
                 <a:ext uri="{91240B29-F687-4f45-9708-019B960494DF}">
-                  <a14:hiddenLine xmlns="" xmlns:a14="http://schemas.microsoft.com/office/drawing/2010/main" w="9525">
+                  <a14:hiddenLine xmlns:a14="http://schemas.microsoft.com/office/drawing/2010/main" xmlns="" w="9525">
                     <a:solidFill>
                       <a:srgbClr val="000000"/>
                     </a:solidFill>
@@ -10493,7 +10493,7 @@
               </a:ln>
               <a:extLst>
                 <a:ext uri="{91240B29-F687-4f45-9708-019B960494DF}">
-                  <a14:hiddenLine xmlns="" xmlns:a14="http://schemas.microsoft.com/office/drawing/2010/main" w="9525">
+                  <a14:hiddenLine xmlns:a14="http://schemas.microsoft.com/office/drawing/2010/main" xmlns="" w="9525">
                     <a:solidFill>
                       <a:srgbClr val="000000"/>
                     </a:solidFill>
@@ -10555,7 +10555,7 @@
               </a:ln>
               <a:extLst>
                 <a:ext uri="{91240B29-F687-4f45-9708-019B960494DF}">
-                  <a14:hiddenLine xmlns="" xmlns:a14="http://schemas.microsoft.com/office/drawing/2010/main" w="9525">
+                  <a14:hiddenLine xmlns:a14="http://schemas.microsoft.com/office/drawing/2010/main" xmlns="" w="9525">
                     <a:solidFill>
                       <a:srgbClr val="000000"/>
                     </a:solidFill>
@@ -10645,7 +10645,7 @@
               </a:ln>
               <a:extLst>
                 <a:ext uri="{91240B29-F687-4f45-9708-019B960494DF}">
-                  <a14:hiddenLine xmlns="" xmlns:a14="http://schemas.microsoft.com/office/drawing/2010/main" w="9525">
+                  <a14:hiddenLine xmlns:a14="http://schemas.microsoft.com/office/drawing/2010/main" xmlns="" w="9525">
                     <a:solidFill>
                       <a:srgbClr val="000000"/>
                     </a:solidFill>
@@ -10707,7 +10707,7 @@
               </a:ln>
               <a:extLst>
                 <a:ext uri="{91240B29-F687-4f45-9708-019B960494DF}">
-                  <a14:hiddenLine xmlns="" xmlns:a14="http://schemas.microsoft.com/office/drawing/2010/main" w="9525">
+                  <a14:hiddenLine xmlns:a14="http://schemas.microsoft.com/office/drawing/2010/main" xmlns="" w="9525">
                     <a:solidFill>
                       <a:srgbClr val="000000"/>
                     </a:solidFill>
@@ -10769,7 +10769,7 @@
               </a:ln>
               <a:extLst>
                 <a:ext uri="{91240B29-F687-4f45-9708-019B960494DF}">
-                  <a14:hiddenLine xmlns="" xmlns:a14="http://schemas.microsoft.com/office/drawing/2010/main" w="9525">
+                  <a14:hiddenLine xmlns:a14="http://schemas.microsoft.com/office/drawing/2010/main" xmlns="" w="9525">
                     <a:solidFill>
                       <a:srgbClr val="000000"/>
                     </a:solidFill>
@@ -10859,7 +10859,7 @@
               </a:ln>
               <a:extLst>
                 <a:ext uri="{91240B29-F687-4f45-9708-019B960494DF}">
-                  <a14:hiddenLine xmlns="" xmlns:a14="http://schemas.microsoft.com/office/drawing/2010/main" w="9525">
+                  <a14:hiddenLine xmlns:a14="http://schemas.microsoft.com/office/drawing/2010/main" xmlns="" w="9525">
                     <a:solidFill>
                       <a:srgbClr val="000000"/>
                     </a:solidFill>
@@ -10949,7 +10949,7 @@
               </a:ln>
               <a:extLst>
                 <a:ext uri="{91240B29-F687-4f45-9708-019B960494DF}">
-                  <a14:hiddenLine xmlns="" xmlns:a14="http://schemas.microsoft.com/office/drawing/2010/main" w="9525">
+                  <a14:hiddenLine xmlns:a14="http://schemas.microsoft.com/office/drawing/2010/main" xmlns="" w="9525">
                     <a:solidFill>
                       <a:srgbClr val="000000"/>
                     </a:solidFill>
@@ -11011,7 +11011,7 @@
               </a:ln>
               <a:extLst>
                 <a:ext uri="{91240B29-F687-4f45-9708-019B960494DF}">
-                  <a14:hiddenLine xmlns="" xmlns:a14="http://schemas.microsoft.com/office/drawing/2010/main" w="9525">
+                  <a14:hiddenLine xmlns:a14="http://schemas.microsoft.com/office/drawing/2010/main" xmlns="" w="9525">
                     <a:solidFill>
                       <a:srgbClr val="000000"/>
                     </a:solidFill>
@@ -11121,7 +11121,7 @@
               </a:ln>
               <a:extLst>
                 <a:ext uri="{91240B29-F687-4f45-9708-019B960494DF}">
-                  <a14:hiddenLine xmlns="" xmlns:a14="http://schemas.microsoft.com/office/drawing/2010/main" w="9525">
+                  <a14:hiddenLine xmlns:a14="http://schemas.microsoft.com/office/drawing/2010/main" xmlns="" w="9525">
                     <a:solidFill>
                       <a:srgbClr val="000000"/>
                     </a:solidFill>
@@ -11205,7 +11205,7 @@
               </a:ln>
               <a:extLst>
                 <a:ext uri="{91240B29-F687-4f45-9708-019B960494DF}">
-                  <a14:hiddenLine xmlns="" xmlns:a14="http://schemas.microsoft.com/office/drawing/2010/main" w="9525">
+                  <a14:hiddenLine xmlns:a14="http://schemas.microsoft.com/office/drawing/2010/main" xmlns="" w="9525">
                     <a:solidFill>
                       <a:srgbClr val="000000"/>
                     </a:solidFill>
@@ -11267,7 +11267,7 @@
               </a:ln>
               <a:extLst>
                 <a:ext uri="{91240B29-F687-4f45-9708-019B960494DF}">
-                  <a14:hiddenLine xmlns="" xmlns:a14="http://schemas.microsoft.com/office/drawing/2010/main" w="9525">
+                  <a14:hiddenLine xmlns:a14="http://schemas.microsoft.com/office/drawing/2010/main" xmlns="" w="9525">
                     <a:solidFill>
                       <a:srgbClr val="000000"/>
                     </a:solidFill>
@@ -11329,7 +11329,7 @@
               </a:ln>
               <a:extLst>
                 <a:ext uri="{91240B29-F687-4f45-9708-019B960494DF}">
-                  <a14:hiddenLine xmlns="" xmlns:a14="http://schemas.microsoft.com/office/drawing/2010/main" w="9525">
+                  <a14:hiddenLine xmlns:a14="http://schemas.microsoft.com/office/drawing/2010/main" xmlns="" w="9525">
                     <a:solidFill>
                       <a:srgbClr val="000000"/>
                     </a:solidFill>
@@ -11419,7 +11419,7 @@
               </a:ln>
               <a:extLst>
                 <a:ext uri="{91240B29-F687-4f45-9708-019B960494DF}">
-                  <a14:hiddenLine xmlns="" xmlns:a14="http://schemas.microsoft.com/office/drawing/2010/main" w="9525">
+                  <a14:hiddenLine xmlns:a14="http://schemas.microsoft.com/office/drawing/2010/main" xmlns="" w="9525">
                     <a:solidFill>
                       <a:srgbClr val="000000"/>
                     </a:solidFill>
@@ -11453,7 +11453,7 @@
               </a:ln>
               <a:extLst>
                 <a:ext uri="{91240B29-F687-4f45-9708-019B960494DF}">
-                  <a14:hiddenLine xmlns="" xmlns:a14="http://schemas.microsoft.com/office/drawing/2010/main" w="9525">
+                  <a14:hiddenLine xmlns:a14="http://schemas.microsoft.com/office/drawing/2010/main" xmlns="" w="9525">
                     <a:solidFill>
                       <a:srgbClr val="000000"/>
                     </a:solidFill>
@@ -11518,7 +11518,7 @@
               </a:ln>
               <a:extLst>
                 <a:ext uri="{91240B29-F687-4f45-9708-019B960494DF}">
-                  <a14:hiddenLine xmlns="" xmlns:a14="http://schemas.microsoft.com/office/drawing/2010/main" w="9525">
+                  <a14:hiddenLine xmlns:a14="http://schemas.microsoft.com/office/drawing/2010/main" xmlns="" w="9525">
                     <a:solidFill>
                       <a:srgbClr val="000000"/>
                     </a:solidFill>
@@ -11608,7 +11608,7 @@
               </a:ln>
               <a:extLst>
                 <a:ext uri="{91240B29-F687-4f45-9708-019B960494DF}">
-                  <a14:hiddenLine xmlns="" xmlns:a14="http://schemas.microsoft.com/office/drawing/2010/main" w="9525">
+                  <a14:hiddenLine xmlns:a14="http://schemas.microsoft.com/office/drawing/2010/main" xmlns="" w="9525">
                     <a:solidFill>
                       <a:srgbClr val="000000"/>
                     </a:solidFill>
@@ -11670,7 +11670,7 @@
               </a:ln>
               <a:extLst>
                 <a:ext uri="{91240B29-F687-4f45-9708-019B960494DF}">
-                  <a14:hiddenLine xmlns="" xmlns:a14="http://schemas.microsoft.com/office/drawing/2010/main" w="9525">
+                  <a14:hiddenLine xmlns:a14="http://schemas.microsoft.com/office/drawing/2010/main" xmlns="" w="9525">
                     <a:solidFill>
                       <a:srgbClr val="000000"/>
                     </a:solidFill>
@@ -11760,7 +11760,7 @@
               </a:ln>
               <a:extLst>
                 <a:ext uri="{91240B29-F687-4f45-9708-019B960494DF}">
-                  <a14:hiddenLine xmlns="" xmlns:a14="http://schemas.microsoft.com/office/drawing/2010/main" w="9525">
+                  <a14:hiddenLine xmlns:a14="http://schemas.microsoft.com/office/drawing/2010/main" xmlns="" w="9525">
                     <a:solidFill>
                       <a:srgbClr val="000000"/>
                     </a:solidFill>
@@ -11825,7 +11825,7 @@
               </a:ln>
               <a:extLst>
                 <a:ext uri="{91240B29-F687-4f45-9708-019B960494DF}">
-                  <a14:hiddenLine xmlns="" xmlns:a14="http://schemas.microsoft.com/office/drawing/2010/main" w="9525">
+                  <a14:hiddenLine xmlns:a14="http://schemas.microsoft.com/office/drawing/2010/main" xmlns="" w="9525">
                     <a:solidFill>
                       <a:srgbClr val="000000"/>
                     </a:solidFill>
@@ -11887,7 +11887,7 @@
               </a:ln>
               <a:extLst>
                 <a:ext uri="{91240B29-F687-4f45-9708-019B960494DF}">
-                  <a14:hiddenLine xmlns="" xmlns:a14="http://schemas.microsoft.com/office/drawing/2010/main" w="9525">
+                  <a14:hiddenLine xmlns:a14="http://schemas.microsoft.com/office/drawing/2010/main" xmlns="" w="9525">
                     <a:solidFill>
                       <a:srgbClr val="000000"/>
                     </a:solidFill>
@@ -11977,7 +11977,7 @@
               </a:ln>
               <a:extLst>
                 <a:ext uri="{91240B29-F687-4f45-9708-019B960494DF}">
-                  <a14:hiddenLine xmlns="" xmlns:a14="http://schemas.microsoft.com/office/drawing/2010/main" w="9525">
+                  <a14:hiddenLine xmlns:a14="http://schemas.microsoft.com/office/drawing/2010/main" xmlns="" w="9525">
                     <a:solidFill>
                       <a:srgbClr val="000000"/>
                     </a:solidFill>
@@ -12067,7 +12067,7 @@
               </a:ln>
               <a:extLst>
                 <a:ext uri="{91240B29-F687-4f45-9708-019B960494DF}">
-                  <a14:hiddenLine xmlns="" xmlns:a14="http://schemas.microsoft.com/office/drawing/2010/main" w="9525">
+                  <a14:hiddenLine xmlns:a14="http://schemas.microsoft.com/office/drawing/2010/main" xmlns="" w="9525">
                     <a:solidFill>
                       <a:srgbClr val="000000"/>
                     </a:solidFill>
@@ -12132,7 +12132,7 @@
               </a:ln>
               <a:extLst>
                 <a:ext uri="{91240B29-F687-4f45-9708-019B960494DF}">
-                  <a14:hiddenLine xmlns="" xmlns:a14="http://schemas.microsoft.com/office/drawing/2010/main" w="9525">
+                  <a14:hiddenLine xmlns:a14="http://schemas.microsoft.com/office/drawing/2010/main" xmlns="" w="9525">
                     <a:solidFill>
                       <a:srgbClr val="000000"/>
                     </a:solidFill>
@@ -12252,7 +12252,7 @@
               </a:ln>
               <a:extLst>
                 <a:ext uri="{91240B29-F687-4f45-9708-019B960494DF}">
-                  <a14:hiddenLine xmlns="" xmlns:a14="http://schemas.microsoft.com/office/drawing/2010/main" w="9525">
+                  <a14:hiddenLine xmlns:a14="http://schemas.microsoft.com/office/drawing/2010/main" xmlns="" w="9525">
                     <a:solidFill>
                       <a:srgbClr val="000000"/>
                     </a:solidFill>
@@ -12333,7 +12333,7 @@
               </a:ln>
               <a:extLst>
                 <a:ext uri="{91240B29-F687-4f45-9708-019B960494DF}">
-                  <a14:hiddenLine xmlns="" xmlns:a14="http://schemas.microsoft.com/office/drawing/2010/main" w="9525">
+                  <a14:hiddenLine xmlns:a14="http://schemas.microsoft.com/office/drawing/2010/main" xmlns="" w="9525">
                     <a:solidFill>
                       <a:srgbClr val="000000"/>
                     </a:solidFill>
@@ -12448,7 +12448,7 @@
               </a:ln>
               <a:extLst>
                 <a:ext uri="{91240B29-F687-4f45-9708-019B960494DF}">
-                  <a14:hiddenLine xmlns="" xmlns:a14="http://schemas.microsoft.com/office/drawing/2010/main" w="9525">
+                  <a14:hiddenLine xmlns:a14="http://schemas.microsoft.com/office/drawing/2010/main" xmlns="" w="9525">
                     <a:solidFill>
                       <a:srgbClr val="000000"/>
                     </a:solidFill>
@@ -12538,7 +12538,7 @@
               </a:ln>
               <a:extLst>
                 <a:ext uri="{91240B29-F687-4f45-9708-019B960494DF}">
-                  <a14:hiddenLine xmlns="" xmlns:a14="http://schemas.microsoft.com/office/drawing/2010/main" w="9525">
+                  <a14:hiddenLine xmlns:a14="http://schemas.microsoft.com/office/drawing/2010/main" xmlns="" w="9525">
                     <a:solidFill>
                       <a:srgbClr val="000000"/>
                     </a:solidFill>
@@ -12603,7 +12603,7 @@
               </a:ln>
               <a:extLst>
                 <a:ext uri="{91240B29-F687-4f45-9708-019B960494DF}">
-                  <a14:hiddenLine xmlns="" xmlns:a14="http://schemas.microsoft.com/office/drawing/2010/main" w="9525">
+                  <a14:hiddenLine xmlns:a14="http://schemas.microsoft.com/office/drawing/2010/main" xmlns="" w="9525">
                     <a:solidFill>
                       <a:srgbClr val="000000"/>
                     </a:solidFill>
@@ -12693,7 +12693,7 @@
               </a:ln>
               <a:extLst>
                 <a:ext uri="{91240B29-F687-4f45-9708-019B960494DF}">
-                  <a14:hiddenLine xmlns="" xmlns:a14="http://schemas.microsoft.com/office/drawing/2010/main" w="9525">
+                  <a14:hiddenLine xmlns:a14="http://schemas.microsoft.com/office/drawing/2010/main" xmlns="" w="9525">
                     <a:solidFill>
                       <a:srgbClr val="000000"/>
                     </a:solidFill>
@@ -12761,7 +12761,7 @@
               </a:ln>
               <a:extLst>
                 <a:ext uri="{91240B29-F687-4f45-9708-019B960494DF}">
-                  <a14:hiddenLine xmlns="" xmlns:a14="http://schemas.microsoft.com/office/drawing/2010/main" w="9525">
+                  <a14:hiddenLine xmlns:a14="http://schemas.microsoft.com/office/drawing/2010/main" xmlns="" w="9525">
                     <a:solidFill>
                       <a:srgbClr val="000000"/>
                     </a:solidFill>
@@ -12851,7 +12851,7 @@
               </a:ln>
               <a:extLst>
                 <a:ext uri="{91240B29-F687-4f45-9708-019B960494DF}">
-                  <a14:hiddenLine xmlns="" xmlns:a14="http://schemas.microsoft.com/office/drawing/2010/main" w="9525">
+                  <a14:hiddenLine xmlns:a14="http://schemas.microsoft.com/office/drawing/2010/main" xmlns="" w="9525">
                     <a:solidFill>
                       <a:srgbClr val="000000"/>
                     </a:solidFill>
@@ -12919,7 +12919,7 @@
               </a:ln>
               <a:extLst>
                 <a:ext uri="{91240B29-F687-4f45-9708-019B960494DF}">
-                  <a14:hiddenLine xmlns="" xmlns:a14="http://schemas.microsoft.com/office/drawing/2010/main" w="9525">
+                  <a14:hiddenLine xmlns:a14="http://schemas.microsoft.com/office/drawing/2010/main" xmlns="" w="9525">
                     <a:solidFill>
                       <a:srgbClr val="000000"/>
                     </a:solidFill>
@@ -13009,7 +13009,7 @@
               </a:ln>
               <a:extLst>
                 <a:ext uri="{91240B29-F687-4f45-9708-019B960494DF}">
-                  <a14:hiddenLine xmlns="" xmlns:a14="http://schemas.microsoft.com/office/drawing/2010/main" w="9525">
+                  <a14:hiddenLine xmlns:a14="http://schemas.microsoft.com/office/drawing/2010/main" xmlns="" w="9525">
                     <a:solidFill>
                       <a:srgbClr val="000000"/>
                     </a:solidFill>
@@ -13043,7 +13043,7 @@
               </a:ln>
               <a:extLst>
                 <a:ext uri="{91240B29-F687-4f45-9708-019B960494DF}">
-                  <a14:hiddenLine xmlns="" xmlns:a14="http://schemas.microsoft.com/office/drawing/2010/main" w="9525">
+                  <a14:hiddenLine xmlns:a14="http://schemas.microsoft.com/office/drawing/2010/main" xmlns="" w="9525">
                     <a:solidFill>
                       <a:srgbClr val="000000"/>
                     </a:solidFill>
@@ -13183,7 +13183,7 @@
           <a:p>
             <a:fld id="{071F4C33-94A3-4D29-AE8D-33950698FF4C}" type="datetimeFigureOut">
               <a:rPr lang="en-US" smtClean="0"/>
-              <a:t>12/11/2016</a:t>
+              <a:t>12/13/2016</a:t>
             </a:fld>
             <a:endParaRPr lang="en-US"/>
           </a:p>
@@ -13642,7 +13642,7 @@
           <a:p>
             <a:r>
               <a:rPr lang="en-US" dirty="0"/>
-              <a:t>Phase TWO Presentation</a:t>
+              <a:t>Phase Three Presentation</a:t>
             </a:r>
           </a:p>
           <a:p>
@@ -14511,32 +14511,26 @@
       </p:sp>
       <p:pic>
         <p:nvPicPr>
-          <p:cNvPr id="8" name="Picture 7"/>
-          <p:cNvPicPr/>
+          <p:cNvPr id="4" name="Picture 3"/>
+          <p:cNvPicPr>
+            <a:picLocks noChangeAspect="1"/>
+          </p:cNvPicPr>
           <p:nvPr/>
         </p:nvPicPr>
         <p:blipFill>
-          <a:blip r:embed="rId3">
-            <a:extLst>
-              <a:ext uri="{28A0092B-C50C-407E-A947-70E740481C1C}">
-                <a14:useLocalDpi xmlns:a14="http://schemas.microsoft.com/office/drawing/2010/main" val="0"/>
-              </a:ext>
-            </a:extLst>
-          </a:blip>
-          <a:srcRect/>
+          <a:blip r:embed="rId3"/>
           <a:stretch>
             <a:fillRect/>
           </a:stretch>
         </p:blipFill>
-        <p:spPr bwMode="auto">
+        <p:spPr>
           <a:xfrm>
-            <a:off x="3011891" y="2380673"/>
-            <a:ext cx="6537354" cy="3843482"/>
+            <a:off x="3009567" y="2417587"/>
+            <a:ext cx="6169687" cy="3913971"/>
           </a:xfrm>
           <a:prstGeom prst="rect">
             <a:avLst/>
           </a:prstGeom>
-          <a:noFill/>
         </p:spPr>
       </p:pic>
     </p:spTree>
@@ -16198,32 +16192,26 @@
       </p:sp>
       <p:pic>
         <p:nvPicPr>
-          <p:cNvPr id="5" name="Picture 4"/>
-          <p:cNvPicPr/>
+          <p:cNvPr id="3" name="Picture 2"/>
+          <p:cNvPicPr>
+            <a:picLocks noChangeAspect="1"/>
+          </p:cNvPicPr>
           <p:nvPr/>
         </p:nvPicPr>
         <p:blipFill>
-          <a:blip r:embed="rId2">
-            <a:extLst>
-              <a:ext uri="{28A0092B-C50C-407E-A947-70E740481C1C}">
-                <a14:useLocalDpi xmlns:a14="http://schemas.microsoft.com/office/drawing/2010/main" val="0"/>
-              </a:ext>
-            </a:extLst>
-          </a:blip>
-          <a:srcRect/>
+          <a:blip r:embed="rId2"/>
           <a:stretch>
             <a:fillRect/>
           </a:stretch>
         </p:blipFill>
-        <p:spPr bwMode="auto">
+        <p:spPr>
           <a:xfrm>
-            <a:off x="3219709" y="3005526"/>
-            <a:ext cx="5269664" cy="3093938"/>
+            <a:off x="3242426" y="2823422"/>
+            <a:ext cx="5693756" cy="3612046"/>
           </a:xfrm>
           <a:prstGeom prst="rect">
             <a:avLst/>
           </a:prstGeom>
-          <a:noFill/>
         </p:spPr>
       </p:pic>
     </p:spTree>

</xml_diff>